<commit_message>
made some changes, want to upload now
</commit_message>
<xml_diff>
--- a/monthly_allocation_high_level.pptx
+++ b/monthly_allocation_high_level.pptx
@@ -3912,8 +3912,8 @@
         </p:nvSpPr>
         <p:spPr>
           <a:xfrm rot="178084">
-            <a:off x="4196714" y="1379338"/>
-            <a:ext cx="304800" cy="228600"/>
+            <a:off x="4194941" y="1303091"/>
+            <a:ext cx="304800" cy="297113"/>
           </a:xfrm>
           <a:prstGeom prst="ellipse">
             <a:avLst/>

</xml_diff>